<commit_message>
FInalising lesson 5 changes
</commit_message>
<xml_diff>
--- a/Python as an additional language/Lesson 5/Session 5.pptx
+++ b/Python as an additional language/Lesson 5/Session 5.pptx
@@ -214,7 +214,7 @@
           <a:p>
             <a:fld id="{6A67AACE-8014-D74E-92DB-28EF6A6E5763}" type="datetimeFigureOut">
               <a:rPr lang="en-US" smtClean="0"/>
-              <a:t>10/19/16</a:t>
+              <a:t>3/1/17</a:t>
             </a:fld>
             <a:endParaRPr lang="en-US"/>
           </a:p>
@@ -697,7 +697,7 @@
           <a:p>
             <a:fld id="{078E73EF-1331-0946-9B97-1355AD4A2800}" type="datetimeFigureOut">
               <a:rPr lang="en-US" smtClean="0"/>
-              <a:t>10/19/16</a:t>
+              <a:t>3/1/17</a:t>
             </a:fld>
             <a:endParaRPr lang="en-US"/>
           </a:p>
@@ -867,7 +867,7 @@
           <a:p>
             <a:fld id="{078E73EF-1331-0946-9B97-1355AD4A2800}" type="datetimeFigureOut">
               <a:rPr lang="en-US" smtClean="0"/>
-              <a:t>10/19/16</a:t>
+              <a:t>3/1/17</a:t>
             </a:fld>
             <a:endParaRPr lang="en-US"/>
           </a:p>
@@ -1047,7 +1047,7 @@
           <a:p>
             <a:fld id="{078E73EF-1331-0946-9B97-1355AD4A2800}" type="datetimeFigureOut">
               <a:rPr lang="en-US" smtClean="0"/>
-              <a:t>10/19/16</a:t>
+              <a:t>3/1/17</a:t>
             </a:fld>
             <a:endParaRPr lang="en-US"/>
           </a:p>
@@ -1217,7 +1217,7 @@
           <a:p>
             <a:fld id="{078E73EF-1331-0946-9B97-1355AD4A2800}" type="datetimeFigureOut">
               <a:rPr lang="en-US" smtClean="0"/>
-              <a:t>10/19/16</a:t>
+              <a:t>3/1/17</a:t>
             </a:fld>
             <a:endParaRPr lang="en-US"/>
           </a:p>
@@ -1463,7 +1463,7 @@
           <a:p>
             <a:fld id="{078E73EF-1331-0946-9B97-1355AD4A2800}" type="datetimeFigureOut">
               <a:rPr lang="en-US" smtClean="0"/>
-              <a:t>10/19/16</a:t>
+              <a:t>3/1/17</a:t>
             </a:fld>
             <a:endParaRPr lang="en-US"/>
           </a:p>
@@ -1695,7 +1695,7 @@
           <a:p>
             <a:fld id="{078E73EF-1331-0946-9B97-1355AD4A2800}" type="datetimeFigureOut">
               <a:rPr lang="en-US" smtClean="0"/>
-              <a:t>10/19/16</a:t>
+              <a:t>3/1/17</a:t>
             </a:fld>
             <a:endParaRPr lang="en-US"/>
           </a:p>
@@ -2062,7 +2062,7 @@
           <a:p>
             <a:fld id="{078E73EF-1331-0946-9B97-1355AD4A2800}" type="datetimeFigureOut">
               <a:rPr lang="en-US" smtClean="0"/>
-              <a:t>10/19/16</a:t>
+              <a:t>3/1/17</a:t>
             </a:fld>
             <a:endParaRPr lang="en-US"/>
           </a:p>
@@ -2180,7 +2180,7 @@
           <a:p>
             <a:fld id="{078E73EF-1331-0946-9B97-1355AD4A2800}" type="datetimeFigureOut">
               <a:rPr lang="en-US" smtClean="0"/>
-              <a:t>10/19/16</a:t>
+              <a:t>3/1/17</a:t>
             </a:fld>
             <a:endParaRPr lang="en-US"/>
           </a:p>
@@ -2275,7 +2275,7 @@
           <a:p>
             <a:fld id="{078E73EF-1331-0946-9B97-1355AD4A2800}" type="datetimeFigureOut">
               <a:rPr lang="en-US" smtClean="0"/>
-              <a:t>10/19/16</a:t>
+              <a:t>3/1/17</a:t>
             </a:fld>
             <a:endParaRPr lang="en-US"/>
           </a:p>
@@ -2552,7 +2552,7 @@
           <a:p>
             <a:fld id="{078E73EF-1331-0946-9B97-1355AD4A2800}" type="datetimeFigureOut">
               <a:rPr lang="en-US" smtClean="0"/>
-              <a:t>10/19/16</a:t>
+              <a:t>3/1/17</a:t>
             </a:fld>
             <a:endParaRPr lang="en-US"/>
           </a:p>
@@ -2805,7 +2805,7 @@
           <a:p>
             <a:fld id="{078E73EF-1331-0946-9B97-1355AD4A2800}" type="datetimeFigureOut">
               <a:rPr lang="en-US" smtClean="0"/>
-              <a:t>10/19/16</a:t>
+              <a:t>3/1/17</a:t>
             </a:fld>
             <a:endParaRPr lang="en-US"/>
           </a:p>
@@ -3018,7 +3018,7 @@
           <a:p>
             <a:fld id="{078E73EF-1331-0946-9B97-1355AD4A2800}" type="datetimeFigureOut">
               <a:rPr lang="en-US" smtClean="0"/>
-              <a:t>10/19/16</a:t>
+              <a:t>3/1/17</a:t>
             </a:fld>
             <a:endParaRPr lang="en-US"/>
           </a:p>
@@ -3534,11 +3534,7 @@
           <a:p>
             <a:r>
               <a:rPr lang="en-US" sz="4000" dirty="0" smtClean="0"/>
-              <a:t>Python As An </a:t>
-            </a:r>
-            <a:r>
-              <a:rPr lang="en-US" sz="4000" dirty="0" smtClean="0"/>
-              <a:t>Additional Language</a:t>
+              <a:t>Python As An Additional Language</a:t>
             </a:r>
             <a:endParaRPr lang="en-US" sz="4000" dirty="0"/>
           </a:p>
@@ -3805,13 +3801,8 @@
             </a:r>
             <a:r>
               <a:rPr lang="en-US" dirty="0" smtClean="0"/>
-              <a:t> </a:t>
-            </a:r>
-            <a:r>
-              <a:rPr lang="en-US" dirty="0" smtClean="0"/>
-              <a:t>?</a:t>
-            </a:r>
-            <a:endParaRPr lang="en-US" dirty="0" smtClean="0"/>
+              <a:t> ?</a:t>
+            </a:r>
           </a:p>
         </p:txBody>
       </p:sp>
@@ -5023,7 +5014,23 @@
             <a:pPr algn="ctr"/>
             <a:r>
               <a:rPr lang="en-US" dirty="0" smtClean="0"/>
-              <a:t>Questions? Comments? Come see us in S32, on Monday, 11:00 – 12:00</a:t>
+              <a:t>Questions? Comments? Come see us in </a:t>
+            </a:r>
+            <a:r>
+              <a:rPr lang="en-US" dirty="0" smtClean="0"/>
+              <a:t>S13, </a:t>
+            </a:r>
+            <a:r>
+              <a:rPr lang="en-US" dirty="0" smtClean="0"/>
+              <a:t>on </a:t>
+            </a:r>
+            <a:r>
+              <a:rPr lang="en-US" dirty="0" smtClean="0"/>
+              <a:t>Thursday, </a:t>
+            </a:r>
+            <a:r>
+              <a:rPr lang="en-US" dirty="0" smtClean="0"/>
+              <a:t>11:00 – 12:00</a:t>
             </a:r>
             <a:endParaRPr lang="en-US" dirty="0"/>
           </a:p>
@@ -5163,7 +5170,7 @@
         <p:spPr/>
         <p:txBody>
           <a:bodyPr>
-            <a:normAutofit lnSpcReduction="10000"/>
+            <a:normAutofit fontScale="92500" lnSpcReduction="10000"/>
           </a:bodyPr>
           <a:lstStyle/>
           <a:p>
@@ -5172,18 +5179,19 @@
               <a:t>Have a look at </a:t>
             </a:r>
             <a:r>
-              <a:rPr lang="en-US" dirty="0" smtClean="0">
-                <a:hlinkClick r:id="rId2"/>
-              </a:rPr>
-              <a:t>http://go/ckw726kk</a:t>
+              <a:rPr lang="en-US" dirty="0"/>
+              <a:t>http://go/5hciuvsg </a:t>
             </a:r>
             <a:endParaRPr lang="en-US" dirty="0" smtClean="0"/>
           </a:p>
           <a:p>
-            <a:pPr lvl="1"/>
             <a:r>
               <a:rPr lang="en-US" dirty="0" smtClean="0"/>
-              <a:t>How does my solution to last week’s exercises differ from yours?</a:t>
+              <a:t>How </a:t>
+            </a:r>
+            <a:r>
+              <a:rPr lang="en-US" dirty="0" smtClean="0"/>
+              <a:t>does my solution to last week’s exercises differ from yours?</a:t>
             </a:r>
           </a:p>
           <a:p>
@@ -5264,7 +5272,7 @@
           <p:nvPr/>
         </p:nvPicPr>
         <p:blipFill>
-          <a:blip r:embed="rId3">
+          <a:blip r:embed="rId2">
             <a:extLst>
               <a:ext uri="{28A0092B-C50C-407E-A947-70E740481C1C}">
                 <a14:useLocalDpi xmlns:a14="http://schemas.microsoft.com/office/drawing/2010/main" val="0"/>
@@ -5294,7 +5302,7 @@
           <p:nvPr/>
         </p:nvPicPr>
         <p:blipFill>
-          <a:blip r:embed="rId4">
+          <a:blip r:embed="rId3">
             <a:extLst>
               <a:ext uri="{28A0092B-C50C-407E-A947-70E740481C1C}">
                 <a14:useLocalDpi xmlns:a14="http://schemas.microsoft.com/office/drawing/2010/main" val="0"/>
@@ -6280,7 +6288,7 @@
             <a:pPr algn="ctr"/>
             <a:r>
               <a:rPr lang="en-US" dirty="0" smtClean="0"/>
-              <a:t>We need to pass the data back and forth</a:t>
+              <a:t>Passing the data back and forth</a:t>
             </a:r>
             <a:endParaRPr lang="en-US" dirty="0"/>
           </a:p>
@@ -6375,6 +6383,36 @@
           </a:prstGeom>
         </p:spPr>
       </p:pic>
+      <p:sp>
+        <p:nvSpPr>
+          <p:cNvPr id="4" name="TextBox 3"/>
+          <p:cNvSpPr txBox="1"/>
+          <p:nvPr/>
+        </p:nvSpPr>
+        <p:spPr>
+          <a:xfrm>
+            <a:off x="3238390" y="4624575"/>
+            <a:ext cx="5715219" cy="369332"/>
+          </a:xfrm>
+          <a:prstGeom prst="rect">
+            <a:avLst/>
+          </a:prstGeom>
+          <a:noFill/>
+        </p:spPr>
+        <p:txBody>
+          <a:bodyPr wrap="none" rtlCol="0">
+            <a:spAutoFit/>
+          </a:bodyPr>
+          <a:lstStyle/>
+          <a:p>
+            <a:r>
+              <a:rPr lang="en-US" dirty="0" smtClean="0"/>
+              <a:t>More to the point, why am I returning restaurants directly? </a:t>
+            </a:r>
+            <a:endParaRPr lang="en-US" dirty="0"/>
+          </a:p>
+        </p:txBody>
+      </p:sp>
     </p:spTree>
     <p:extLst>
       <p:ext uri="{BB962C8B-B14F-4D97-AF65-F5344CB8AC3E}">

</xml_diff>

<commit_message>
Tweak to http://go url on slide 2
</commit_message>
<xml_diff>
--- a/Python as an additional language/Lesson 5/Session 5.pptx
+++ b/Python as an additional language/Lesson 5/Session 5.pptx
@@ -5176,11 +5176,33 @@
           <a:p>
             <a:r>
               <a:rPr lang="en-US" dirty="0" smtClean="0"/>
-              <a:t>Have a look at </a:t>
-            </a:r>
-            <a:r>
-              <a:rPr lang="en-US" dirty="0"/>
-              <a:t>http://go/5hciuvsg </a:t>
+              <a:t>Have a look </a:t>
+            </a:r>
+            <a:r>
+              <a:rPr lang="en-US" smtClean="0"/>
+              <a:t>at </a:t>
+            </a:r>
+            <a:r>
+              <a:rPr lang="en-US">
+                <a:hlinkClick r:id="rId2"/>
+              </a:rPr>
+              <a:t>http</a:t>
+            </a:r>
+            <a:r>
+              <a:rPr lang="en-US">
+                <a:hlinkClick r:id="rId2"/>
+              </a:rPr>
+              <a:t>://</a:t>
+            </a:r>
+            <a:r>
+              <a:rPr lang="en-US" smtClean="0">
+                <a:hlinkClick r:id="rId2"/>
+              </a:rPr>
+              <a:t>go/x2std3ms</a:t>
+            </a:r>
+            <a:r>
+              <a:rPr lang="en-US" smtClean="0"/>
+              <a:t> </a:t>
             </a:r>
             <a:endParaRPr lang="en-US" dirty="0" smtClean="0"/>
           </a:p>
@@ -5272,7 +5294,7 @@
           <p:nvPr/>
         </p:nvPicPr>
         <p:blipFill>
-          <a:blip r:embed="rId2">
+          <a:blip r:embed="rId3">
             <a:extLst>
               <a:ext uri="{28A0092B-C50C-407E-A947-70E740481C1C}">
                 <a14:useLocalDpi xmlns:a14="http://schemas.microsoft.com/office/drawing/2010/main" val="0"/>
@@ -5302,7 +5324,7 @@
           <p:nvPr/>
         </p:nvPicPr>
         <p:blipFill>
-          <a:blip r:embed="rId3">
+          <a:blip r:embed="rId4">
             <a:extLst>
               <a:ext uri="{28A0092B-C50C-407E-A947-70E740481C1C}">
                 <a14:useLocalDpi xmlns:a14="http://schemas.microsoft.com/office/drawing/2010/main" val="0"/>

</xml_diff>

<commit_message>
Removed JSON references (spoilers!)
</commit_message>
<xml_diff>
--- a/Python as an additional language/Lesson 5/Session 5.pptx
+++ b/Python as an additional language/Lesson 5/Session 5.pptx
@@ -17,14 +17,14 @@
     <p:sldId id="263" r:id="rId8"/>
     <p:sldId id="264" r:id="rId9"/>
     <p:sldId id="265" r:id="rId10"/>
-    <p:sldId id="276" r:id="rId11"/>
-    <p:sldId id="267" r:id="rId12"/>
-    <p:sldId id="271" r:id="rId13"/>
-    <p:sldId id="277" r:id="rId14"/>
-    <p:sldId id="272" r:id="rId15"/>
-    <p:sldId id="273" r:id="rId16"/>
-    <p:sldId id="269" r:id="rId17"/>
-    <p:sldId id="270" r:id="rId18"/>
+    <p:sldId id="278" r:id="rId11"/>
+    <p:sldId id="279" r:id="rId12"/>
+    <p:sldId id="276" r:id="rId13"/>
+    <p:sldId id="267" r:id="rId14"/>
+    <p:sldId id="271" r:id="rId15"/>
+    <p:sldId id="277" r:id="rId16"/>
+    <p:sldId id="272" r:id="rId17"/>
+    <p:sldId id="273" r:id="rId18"/>
     <p:sldId id="275" r:id="rId19"/>
   </p:sldIdLst>
   <p:sldSz cx="12192000" cy="6858000"/>
@@ -3565,7 +3565,11 @@
             <a:pPr algn="ctr"/>
             <a:r>
               <a:rPr lang="en-US" sz="2800" dirty="0" smtClean="0"/>
-              <a:t>Lesson 5: Getting Modular, getting Classy and talking with JSON</a:t>
+              <a:t>Lesson 5: Getting Modular, </a:t>
+            </a:r>
+            <a:r>
+              <a:rPr lang="en-US" sz="2800" dirty="0" smtClean="0"/>
+              <a:t>and getting Classy</a:t>
             </a:r>
             <a:endParaRPr lang="en-US" sz="2800" dirty="0"/>
           </a:p>
@@ -3592,6 +3596,304 @@
 </file>
 
 <file path=ppt/slides/slide10.xml><?xml version="1.0" encoding="utf-8"?>
+<p:sld xmlns:a="http://schemas.openxmlformats.org/drawingml/2006/main" xmlns:r="http://schemas.openxmlformats.org/officeDocument/2006/relationships" xmlns:p="http://schemas.openxmlformats.org/presentationml/2006/main">
+  <p:cSld>
+    <p:spTree>
+      <p:nvGrpSpPr>
+        <p:cNvPr id="1" name=""/>
+        <p:cNvGrpSpPr/>
+        <p:nvPr/>
+      </p:nvGrpSpPr>
+      <p:grpSpPr>
+        <a:xfrm>
+          <a:off x="0" y="0"/>
+          <a:ext cx="0" cy="0"/>
+          <a:chOff x="0" y="0"/>
+          <a:chExt cx="0" cy="0"/>
+        </a:xfrm>
+      </p:grpSpPr>
+      <p:sp>
+        <p:nvSpPr>
+          <p:cNvPr id="2" name="Title 1"/>
+          <p:cNvSpPr>
+            <a:spLocks noGrp="1"/>
+          </p:cNvSpPr>
+          <p:nvPr>
+            <p:ph type="title"/>
+          </p:nvPr>
+        </p:nvSpPr>
+        <p:spPr/>
+        <p:txBody>
+          <a:bodyPr/>
+          <a:lstStyle/>
+          <a:p>
+            <a:pPr algn="ctr"/>
+            <a:r>
+              <a:rPr lang="en-US" dirty="0" smtClean="0"/>
+              <a:t>What is a Restaurant?</a:t>
+            </a:r>
+            <a:endParaRPr lang="en-US" dirty="0"/>
+          </a:p>
+        </p:txBody>
+      </p:sp>
+      <p:sp>
+        <p:nvSpPr>
+          <p:cNvPr id="3" name="Content Placeholder 2"/>
+          <p:cNvSpPr>
+            <a:spLocks noGrp="1"/>
+          </p:cNvSpPr>
+          <p:nvPr>
+            <p:ph idx="1"/>
+          </p:nvPr>
+        </p:nvSpPr>
+        <p:spPr/>
+        <p:txBody>
+          <a:bodyPr/>
+          <a:lstStyle/>
+          <a:p>
+            <a:r>
+              <a:rPr lang="en-US" dirty="0" smtClean="0"/>
+              <a:t>What properties does a Restaurant have?</a:t>
+            </a:r>
+          </a:p>
+          <a:p>
+            <a:pPr lvl="1"/>
+            <a:r>
+              <a:rPr lang="en-US" dirty="0" smtClean="0"/>
+              <a:t>How much we like it</a:t>
+            </a:r>
+          </a:p>
+          <a:p>
+            <a:pPr lvl="1"/>
+            <a:r>
+              <a:rPr lang="en-US" dirty="0" smtClean="0"/>
+              <a:t>How far away it is</a:t>
+            </a:r>
+          </a:p>
+          <a:p>
+            <a:pPr lvl="1"/>
+            <a:r>
+              <a:rPr lang="en-US" dirty="0" smtClean="0"/>
+              <a:t>What sort of food it sells</a:t>
+            </a:r>
+          </a:p>
+          <a:p>
+            <a:pPr lvl="1"/>
+            <a:r>
+              <a:rPr lang="en-US" dirty="0" smtClean="0"/>
+              <a:t>How expensive it is	</a:t>
+            </a:r>
+          </a:p>
+          <a:p>
+            <a:r>
+              <a:rPr lang="en-US" dirty="0" smtClean="0"/>
+              <a:t>Anything else?</a:t>
+            </a:r>
+          </a:p>
+        </p:txBody>
+      </p:sp>
+      <p:pic>
+        <p:nvPicPr>
+          <p:cNvPr id="4" name="Picture 3"/>
+          <p:cNvPicPr>
+            <a:picLocks noChangeAspect="1"/>
+          </p:cNvPicPr>
+          <p:nvPr/>
+        </p:nvPicPr>
+        <p:blipFill>
+          <a:blip r:embed="rId2">
+            <a:extLst>
+              <a:ext uri="{28A0092B-C50C-407E-A947-70E740481C1C}">
+                <a14:useLocalDpi xmlns:a14="http://schemas.microsoft.com/office/drawing/2010/main" val="0"/>
+              </a:ext>
+            </a:extLst>
+          </a:blip>
+          <a:stretch>
+            <a:fillRect/>
+          </a:stretch>
+        </p:blipFill>
+        <p:spPr>
+          <a:xfrm>
+            <a:off x="9801412" y="4624575"/>
+            <a:ext cx="1552388" cy="1552388"/>
+          </a:xfrm>
+          <a:prstGeom prst="rect">
+            <a:avLst/>
+          </a:prstGeom>
+        </p:spPr>
+      </p:pic>
+    </p:spTree>
+    <p:extLst>
+      <p:ext uri="{BB962C8B-B14F-4D97-AF65-F5344CB8AC3E}">
+        <p14:creationId xmlns:p14="http://schemas.microsoft.com/office/powerpoint/2010/main" val="713810647"/>
+      </p:ext>
+    </p:extLst>
+  </p:cSld>
+  <p:clrMapOvr>
+    <a:masterClrMapping/>
+  </p:clrMapOvr>
+</p:sld>
+</file>
+
+<file path=ppt/slides/slide11.xml><?xml version="1.0" encoding="utf-8"?>
+<p:sld xmlns:a="http://schemas.openxmlformats.org/drawingml/2006/main" xmlns:r="http://schemas.openxmlformats.org/officeDocument/2006/relationships" xmlns:p="http://schemas.openxmlformats.org/presentationml/2006/main">
+  <p:cSld>
+    <p:spTree>
+      <p:nvGrpSpPr>
+        <p:cNvPr id="1" name=""/>
+        <p:cNvGrpSpPr/>
+        <p:nvPr/>
+      </p:nvGrpSpPr>
+      <p:grpSpPr>
+        <a:xfrm>
+          <a:off x="0" y="0"/>
+          <a:ext cx="0" cy="0"/>
+          <a:chOff x="0" y="0"/>
+          <a:chExt cx="0" cy="0"/>
+        </a:xfrm>
+      </p:grpSpPr>
+      <p:sp>
+        <p:nvSpPr>
+          <p:cNvPr id="2" name="Title 1"/>
+          <p:cNvSpPr>
+            <a:spLocks noGrp="1"/>
+          </p:cNvSpPr>
+          <p:nvPr>
+            <p:ph type="title"/>
+          </p:nvPr>
+        </p:nvSpPr>
+        <p:spPr/>
+        <p:txBody>
+          <a:bodyPr/>
+          <a:lstStyle/>
+          <a:p>
+            <a:pPr algn="ctr"/>
+            <a:r>
+              <a:rPr lang="en-US" dirty="0" smtClean="0"/>
+              <a:t>What is a Restaurant?</a:t>
+            </a:r>
+            <a:endParaRPr lang="en-US" dirty="0"/>
+          </a:p>
+        </p:txBody>
+      </p:sp>
+      <p:sp>
+        <p:nvSpPr>
+          <p:cNvPr id="3" name="Content Placeholder 2"/>
+          <p:cNvSpPr>
+            <a:spLocks noGrp="1"/>
+          </p:cNvSpPr>
+          <p:nvPr>
+            <p:ph idx="1"/>
+          </p:nvPr>
+        </p:nvSpPr>
+        <p:spPr/>
+        <p:txBody>
+          <a:bodyPr/>
+          <a:lstStyle/>
+          <a:p>
+            <a:r>
+              <a:rPr lang="en-US" dirty="0" smtClean="0"/>
+              <a:t>What properties does a Restaurant have?</a:t>
+            </a:r>
+          </a:p>
+          <a:p>
+            <a:pPr lvl="1"/>
+            <a:r>
+              <a:rPr lang="en-US" dirty="0" smtClean="0"/>
+              <a:t>How much we like it</a:t>
+            </a:r>
+          </a:p>
+          <a:p>
+            <a:pPr lvl="1"/>
+            <a:r>
+              <a:rPr lang="en-US" dirty="0" smtClean="0"/>
+              <a:t>How far away it is</a:t>
+            </a:r>
+          </a:p>
+          <a:p>
+            <a:pPr lvl="1"/>
+            <a:r>
+              <a:rPr lang="en-US" dirty="0" smtClean="0"/>
+              <a:t>What sort of food it sells</a:t>
+            </a:r>
+          </a:p>
+          <a:p>
+            <a:pPr lvl="1"/>
+            <a:r>
+              <a:rPr lang="en-US" dirty="0" smtClean="0"/>
+              <a:t>How expensive it is	</a:t>
+            </a:r>
+          </a:p>
+          <a:p>
+            <a:r>
+              <a:rPr lang="en-US" dirty="0" smtClean="0"/>
+              <a:t>Anything else?</a:t>
+            </a:r>
+          </a:p>
+          <a:p>
+            <a:pPr lvl="1"/>
+            <a:r>
+              <a:rPr lang="en-US" dirty="0" smtClean="0"/>
+              <a:t>It might be a takeaway</a:t>
+            </a:r>
+          </a:p>
+          <a:p>
+            <a:pPr lvl="1"/>
+            <a:r>
+              <a:rPr lang="en-US" dirty="0" smtClean="0"/>
+              <a:t>It might have a dress code</a:t>
+            </a:r>
+          </a:p>
+          <a:p>
+            <a:pPr lvl="1"/>
+            <a:endParaRPr lang="en-US" dirty="0" smtClean="0"/>
+          </a:p>
+        </p:txBody>
+      </p:sp>
+      <p:pic>
+        <p:nvPicPr>
+          <p:cNvPr id="4" name="Picture 3"/>
+          <p:cNvPicPr>
+            <a:picLocks noChangeAspect="1"/>
+          </p:cNvPicPr>
+          <p:nvPr/>
+        </p:nvPicPr>
+        <p:blipFill>
+          <a:blip r:embed="rId2">
+            <a:extLst>
+              <a:ext uri="{28A0092B-C50C-407E-A947-70E740481C1C}">
+                <a14:useLocalDpi xmlns:a14="http://schemas.microsoft.com/office/drawing/2010/main" val="0"/>
+              </a:ext>
+            </a:extLst>
+          </a:blip>
+          <a:stretch>
+            <a:fillRect/>
+          </a:stretch>
+        </p:blipFill>
+        <p:spPr>
+          <a:xfrm>
+            <a:off x="9801412" y="4624575"/>
+            <a:ext cx="1552388" cy="1552388"/>
+          </a:xfrm>
+          <a:prstGeom prst="rect">
+            <a:avLst/>
+          </a:prstGeom>
+        </p:spPr>
+      </p:pic>
+    </p:spTree>
+    <p:extLst>
+      <p:ext uri="{BB962C8B-B14F-4D97-AF65-F5344CB8AC3E}">
+        <p14:creationId xmlns:p14="http://schemas.microsoft.com/office/powerpoint/2010/main" val="1171891987"/>
+      </p:ext>
+    </p:extLst>
+  </p:cSld>
+  <p:clrMapOvr>
+    <a:masterClrMapping/>
+  </p:clrMapOvr>
+</p:sld>
+</file>
+
+<file path=ppt/slides/slide12.xml><?xml version="1.0" encoding="utf-8"?>
 <p:sld xmlns:a="http://schemas.openxmlformats.org/drawingml/2006/main" xmlns:r="http://schemas.openxmlformats.org/officeDocument/2006/relationships" xmlns:p="http://schemas.openxmlformats.org/presentationml/2006/main">
   <p:cSld>
     <p:spTree>
@@ -3718,7 +4020,7 @@
 </p:sld>
 </file>
 
-<file path=ppt/slides/slide11.xml><?xml version="1.0" encoding="utf-8"?>
+<file path=ppt/slides/slide13.xml><?xml version="1.0" encoding="utf-8"?>
 <p:sld xmlns:a="http://schemas.openxmlformats.org/drawingml/2006/main" xmlns:r="http://schemas.openxmlformats.org/officeDocument/2006/relationships" xmlns:p="http://schemas.openxmlformats.org/presentationml/2006/main">
   <p:cSld>
     <p:spTree>
@@ -3886,7 +4188,7 @@
 </p:sld>
 </file>
 
-<file path=ppt/slides/slide12.xml><?xml version="1.0" encoding="utf-8"?>
+<file path=ppt/slides/slide14.xml><?xml version="1.0" encoding="utf-8"?>
 <p:sld xmlns:a="http://schemas.openxmlformats.org/drawingml/2006/main" xmlns:r="http://schemas.openxmlformats.org/officeDocument/2006/relationships" xmlns:p="http://schemas.openxmlformats.org/presentationml/2006/main">
   <p:cSld>
     <p:spTree>
@@ -4067,7 +4369,7 @@
 </p:sld>
 </file>
 
-<file path=ppt/slides/slide13.xml><?xml version="1.0" encoding="utf-8"?>
+<file path=ppt/slides/slide15.xml><?xml version="1.0" encoding="utf-8"?>
 <p:sld xmlns:a="http://schemas.openxmlformats.org/drawingml/2006/main" xmlns:r="http://schemas.openxmlformats.org/officeDocument/2006/relationships" xmlns:p="http://schemas.openxmlformats.org/presentationml/2006/main">
   <p:cSld>
     <p:spTree>
@@ -4288,7 +4590,7 @@
 </p:sld>
 </file>
 
-<file path=ppt/slides/slide14.xml><?xml version="1.0" encoding="utf-8"?>
+<file path=ppt/slides/slide16.xml><?xml version="1.0" encoding="utf-8"?>
 <p:sld xmlns:a="http://schemas.openxmlformats.org/drawingml/2006/main" xmlns:r="http://schemas.openxmlformats.org/officeDocument/2006/relationships" xmlns:p="http://schemas.openxmlformats.org/presentationml/2006/main">
   <p:cSld>
     <p:spTree>
@@ -4408,7 +4710,7 @@
 </p:sld>
 </file>
 
-<file path=ppt/slides/slide15.xml><?xml version="1.0" encoding="utf-8"?>
+<file path=ppt/slides/slide17.xml><?xml version="1.0" encoding="utf-8"?>
 <p:sld xmlns:a="http://schemas.openxmlformats.org/drawingml/2006/main" xmlns:r="http://schemas.openxmlformats.org/officeDocument/2006/relationships" xmlns:p="http://schemas.openxmlformats.org/presentationml/2006/main">
   <p:cSld>
     <p:spTree>
@@ -4528,374 +4830,6 @@
 </p:sld>
 </file>
 
-<file path=ppt/slides/slide16.xml><?xml version="1.0" encoding="utf-8"?>
-<p:sld xmlns:a="http://schemas.openxmlformats.org/drawingml/2006/main" xmlns:r="http://schemas.openxmlformats.org/officeDocument/2006/relationships" xmlns:p="http://schemas.openxmlformats.org/presentationml/2006/main">
-  <p:cSld>
-    <p:spTree>
-      <p:nvGrpSpPr>
-        <p:cNvPr id="1" name=""/>
-        <p:cNvGrpSpPr/>
-        <p:nvPr/>
-      </p:nvGrpSpPr>
-      <p:grpSpPr>
-        <a:xfrm>
-          <a:off x="0" y="0"/>
-          <a:ext cx="0" cy="0"/>
-          <a:chOff x="0" y="0"/>
-          <a:chExt cx="0" cy="0"/>
-        </a:xfrm>
-      </p:grpSpPr>
-      <p:sp>
-        <p:nvSpPr>
-          <p:cNvPr id="2" name="Title 1"/>
-          <p:cNvSpPr>
-            <a:spLocks noGrp="1"/>
-          </p:cNvSpPr>
-          <p:nvPr>
-            <p:ph type="title"/>
-          </p:nvPr>
-        </p:nvSpPr>
-        <p:spPr/>
-        <p:txBody>
-          <a:bodyPr>
-            <a:normAutofit/>
-          </a:bodyPr>
-          <a:lstStyle/>
-          <a:p>
-            <a:r>
-              <a:rPr lang="en-US" dirty="0" smtClean="0"/>
-              <a:t>Dealing with JSON: JavaScript </a:t>
-            </a:r>
-            <a:r>
-              <a:rPr lang="en-US" dirty="0"/>
-              <a:t>Object </a:t>
-            </a:r>
-            <a:r>
-              <a:rPr lang="en-US" dirty="0" smtClean="0"/>
-              <a:t>Notation</a:t>
-            </a:r>
-            <a:endParaRPr lang="en-US" dirty="0"/>
-          </a:p>
-        </p:txBody>
-      </p:sp>
-      <p:sp>
-        <p:nvSpPr>
-          <p:cNvPr id="3" name="Content Placeholder 2"/>
-          <p:cNvSpPr>
-            <a:spLocks noGrp="1"/>
-          </p:cNvSpPr>
-          <p:nvPr>
-            <p:ph idx="1"/>
-          </p:nvPr>
-        </p:nvSpPr>
-        <p:spPr/>
-        <p:txBody>
-          <a:bodyPr/>
-          <a:lstStyle/>
-          <a:p>
-            <a:r>
-              <a:rPr lang="en-US" dirty="0" smtClean="0">
-                <a:ea typeface="Consolas" charset="0"/>
-                <a:cs typeface="Consolas" charset="0"/>
-              </a:rPr>
-              <a:t>Don’t forget to </a:t>
-            </a:r>
-            <a:r>
-              <a:rPr lang="en-US" dirty="0" smtClean="0">
-                <a:latin typeface="Consolas" charset="0"/>
-                <a:ea typeface="Consolas" charset="0"/>
-                <a:cs typeface="Consolas" charset="0"/>
-              </a:rPr>
-              <a:t>import </a:t>
-            </a:r>
-            <a:r>
-              <a:rPr lang="en-US" dirty="0" err="1" smtClean="0">
-                <a:latin typeface="Consolas" charset="0"/>
-                <a:ea typeface="Consolas" charset="0"/>
-                <a:cs typeface="Consolas" charset="0"/>
-              </a:rPr>
-              <a:t>json</a:t>
-            </a:r>
-            <a:endParaRPr lang="en-US" dirty="0">
-              <a:latin typeface="Consolas" charset="0"/>
-              <a:ea typeface="Consolas" charset="0"/>
-              <a:cs typeface="Consolas" charset="0"/>
-            </a:endParaRPr>
-          </a:p>
-        </p:txBody>
-      </p:sp>
-      <p:sp>
-        <p:nvSpPr>
-          <p:cNvPr id="6" name="TextBox 5"/>
-          <p:cNvSpPr txBox="1"/>
-          <p:nvPr/>
-        </p:nvSpPr>
-        <p:spPr>
-          <a:xfrm>
-            <a:off x="1785257" y="5138057"/>
-            <a:ext cx="6664901" cy="646331"/>
-          </a:xfrm>
-          <a:prstGeom prst="rect">
-            <a:avLst/>
-          </a:prstGeom>
-          <a:noFill/>
-        </p:spPr>
-        <p:txBody>
-          <a:bodyPr wrap="none" rtlCol="0">
-            <a:spAutoFit/>
-          </a:bodyPr>
-          <a:lstStyle/>
-          <a:p>
-            <a:r>
-              <a:rPr lang="en-US" dirty="0" smtClean="0"/>
-              <a:t>What  do the </a:t>
-            </a:r>
-            <a:r>
-              <a:rPr lang="en-US" dirty="0" err="1" smtClean="0">
-                <a:latin typeface="Consolas" charset="0"/>
-                <a:ea typeface="Consolas" charset="0"/>
-                <a:cs typeface="Consolas" charset="0"/>
-              </a:rPr>
-              <a:t>sort_keys</a:t>
-            </a:r>
-            <a:r>
-              <a:rPr lang="en-US" dirty="0" smtClean="0"/>
-              <a:t>, </a:t>
-            </a:r>
-            <a:r>
-              <a:rPr lang="en-US" dirty="0" smtClean="0">
-                <a:latin typeface="Consolas" charset="0"/>
-                <a:ea typeface="Consolas" charset="0"/>
-                <a:cs typeface="Consolas" charset="0"/>
-              </a:rPr>
-              <a:t>indent</a:t>
-            </a:r>
-            <a:r>
-              <a:rPr lang="en-US" dirty="0" smtClean="0"/>
-              <a:t> and </a:t>
-            </a:r>
-            <a:r>
-              <a:rPr lang="en-US" dirty="0" smtClean="0">
-                <a:latin typeface="Consolas" charset="0"/>
-                <a:ea typeface="Consolas" charset="0"/>
-                <a:cs typeface="Consolas" charset="0"/>
-              </a:rPr>
-              <a:t>separators</a:t>
-            </a:r>
-            <a:r>
-              <a:rPr lang="en-US" dirty="0" smtClean="0"/>
-              <a:t> arguments do?</a:t>
-            </a:r>
-          </a:p>
-          <a:p>
-            <a:r>
-              <a:rPr lang="en-US" dirty="0" smtClean="0"/>
-              <a:t>Can we leave them out?</a:t>
-            </a:r>
-            <a:endParaRPr lang="en-US" dirty="0"/>
-          </a:p>
-        </p:txBody>
-      </p:sp>
-      <p:pic>
-        <p:nvPicPr>
-          <p:cNvPr id="8" name="Picture 7"/>
-          <p:cNvPicPr>
-            <a:picLocks noChangeAspect="1"/>
-          </p:cNvPicPr>
-          <p:nvPr/>
-        </p:nvPicPr>
-        <p:blipFill>
-          <a:blip r:embed="rId2">
-            <a:extLst>
-              <a:ext uri="{28A0092B-C50C-407E-A947-70E740481C1C}">
-                <a14:useLocalDpi xmlns:a14="http://schemas.microsoft.com/office/drawing/2010/main" val="0"/>
-              </a:ext>
-            </a:extLst>
-          </a:blip>
-          <a:stretch>
-            <a:fillRect/>
-          </a:stretch>
-        </p:blipFill>
-        <p:spPr>
-          <a:xfrm>
-            <a:off x="9801412" y="4624575"/>
-            <a:ext cx="1552388" cy="1552388"/>
-          </a:xfrm>
-          <a:prstGeom prst="rect">
-            <a:avLst/>
-          </a:prstGeom>
-        </p:spPr>
-      </p:pic>
-      <p:pic>
-        <p:nvPicPr>
-          <p:cNvPr id="4" name="Picture 3"/>
-          <p:cNvPicPr>
-            <a:picLocks noChangeAspect="1"/>
-          </p:cNvPicPr>
-          <p:nvPr/>
-        </p:nvPicPr>
-        <p:blipFill>
-          <a:blip r:embed="rId3">
-            <a:extLst>
-              <a:ext uri="{28A0092B-C50C-407E-A947-70E740481C1C}">
-                <a14:useLocalDpi xmlns:a14="http://schemas.microsoft.com/office/drawing/2010/main" val="0"/>
-              </a:ext>
-            </a:extLst>
-          </a:blip>
-          <a:stretch>
-            <a:fillRect/>
-          </a:stretch>
-        </p:blipFill>
-        <p:spPr>
-          <a:xfrm>
-            <a:off x="1351461" y="2531076"/>
-            <a:ext cx="9489077" cy="1958562"/>
-          </a:xfrm>
-          <a:prstGeom prst="rect">
-            <a:avLst/>
-          </a:prstGeom>
-        </p:spPr>
-      </p:pic>
-    </p:spTree>
-    <p:extLst>
-      <p:ext uri="{BB962C8B-B14F-4D97-AF65-F5344CB8AC3E}">
-        <p14:creationId xmlns:p14="http://schemas.microsoft.com/office/powerpoint/2010/main" val="852343046"/>
-      </p:ext>
-    </p:extLst>
-  </p:cSld>
-  <p:clrMapOvr>
-    <a:masterClrMapping/>
-  </p:clrMapOvr>
-  <p:timing>
-    <p:tnLst>
-      <p:par>
-        <p:cTn id="1" dur="indefinite" restart="never" nodeType="tmRoot"/>
-      </p:par>
-    </p:tnLst>
-  </p:timing>
-</p:sld>
-</file>
-
-<file path=ppt/slides/slide17.xml><?xml version="1.0" encoding="utf-8"?>
-<p:sld xmlns:a="http://schemas.openxmlformats.org/drawingml/2006/main" xmlns:r="http://schemas.openxmlformats.org/officeDocument/2006/relationships" xmlns:p="http://schemas.openxmlformats.org/presentationml/2006/main">
-  <p:cSld>
-    <p:spTree>
-      <p:nvGrpSpPr>
-        <p:cNvPr id="1" name=""/>
-        <p:cNvGrpSpPr/>
-        <p:nvPr/>
-      </p:nvGrpSpPr>
-      <p:grpSpPr>
-        <a:xfrm>
-          <a:off x="0" y="0"/>
-          <a:ext cx="0" cy="0"/>
-          <a:chOff x="0" y="0"/>
-          <a:chExt cx="0" cy="0"/>
-        </a:xfrm>
-      </p:grpSpPr>
-      <p:sp>
-        <p:nvSpPr>
-          <p:cNvPr id="2" name="Title 1"/>
-          <p:cNvSpPr>
-            <a:spLocks noGrp="1"/>
-          </p:cNvSpPr>
-          <p:nvPr>
-            <p:ph type="title"/>
-          </p:nvPr>
-        </p:nvSpPr>
-        <p:spPr/>
-        <p:txBody>
-          <a:bodyPr/>
-          <a:lstStyle/>
-          <a:p>
-            <a:pPr algn="ctr"/>
-            <a:r>
-              <a:rPr lang="en-US" dirty="0" smtClean="0"/>
-              <a:t>Doing the opposite </a:t>
-            </a:r>
-            <a:endParaRPr lang="en-US" dirty="0"/>
-          </a:p>
-        </p:txBody>
-      </p:sp>
-      <p:pic>
-        <p:nvPicPr>
-          <p:cNvPr id="9" name="Picture 8"/>
-          <p:cNvPicPr>
-            <a:picLocks noChangeAspect="1"/>
-          </p:cNvPicPr>
-          <p:nvPr/>
-        </p:nvPicPr>
-        <p:blipFill>
-          <a:blip r:embed="rId2">
-            <a:extLst>
-              <a:ext uri="{28A0092B-C50C-407E-A947-70E740481C1C}">
-                <a14:useLocalDpi xmlns:a14="http://schemas.microsoft.com/office/drawing/2010/main" val="0"/>
-              </a:ext>
-            </a:extLst>
-          </a:blip>
-          <a:stretch>
-            <a:fillRect/>
-          </a:stretch>
-        </p:blipFill>
-        <p:spPr>
-          <a:xfrm>
-            <a:off x="9801412" y="4624575"/>
-            <a:ext cx="1552388" cy="1552388"/>
-          </a:xfrm>
-          <a:prstGeom prst="rect">
-            <a:avLst/>
-          </a:prstGeom>
-        </p:spPr>
-      </p:pic>
-      <p:pic>
-        <p:nvPicPr>
-          <p:cNvPr id="5" name="Content Placeholder 4"/>
-          <p:cNvPicPr>
-            <a:picLocks noGrp="1" noChangeAspect="1"/>
-          </p:cNvPicPr>
-          <p:nvPr>
-            <p:ph idx="1"/>
-          </p:nvPr>
-        </p:nvPicPr>
-        <p:blipFill>
-          <a:blip r:embed="rId3">
-            <a:extLst>
-              <a:ext uri="{28A0092B-C50C-407E-A947-70E740481C1C}">
-                <a14:useLocalDpi xmlns:a14="http://schemas.microsoft.com/office/drawing/2010/main" val="0"/>
-              </a:ext>
-            </a:extLst>
-          </a:blip>
-          <a:stretch>
-            <a:fillRect/>
-          </a:stretch>
-        </p:blipFill>
-        <p:spPr>
-          <a:xfrm>
-            <a:off x="1030163" y="2159586"/>
-            <a:ext cx="10131674" cy="1996091"/>
-          </a:xfrm>
-        </p:spPr>
-      </p:pic>
-    </p:spTree>
-    <p:extLst>
-      <p:ext uri="{BB962C8B-B14F-4D97-AF65-F5344CB8AC3E}">
-        <p14:creationId xmlns:p14="http://schemas.microsoft.com/office/powerpoint/2010/main" val="751579856"/>
-      </p:ext>
-    </p:extLst>
-  </p:cSld>
-  <p:clrMapOvr>
-    <a:masterClrMapping/>
-  </p:clrMapOvr>
-  <p:timing>
-    <p:tnLst>
-      <p:par>
-        <p:cTn id="1" dur="indefinite" restart="never" nodeType="tmRoot"/>
-      </p:par>
-    </p:tnLst>
-  </p:timing>
-</p:sld>
-</file>
-
 <file path=ppt/slides/slide18.xml><?xml version="1.0" encoding="utf-8"?>
 <p:sld xmlns:a="http://schemas.openxmlformats.org/drawingml/2006/main" xmlns:r="http://schemas.openxmlformats.org/officeDocument/2006/relationships" xmlns:p="http://schemas.openxmlformats.org/presentationml/2006/main">
   <p:cSld>
@@ -5014,23 +4948,7 @@
             <a:pPr algn="ctr"/>
             <a:r>
               <a:rPr lang="en-US" dirty="0" smtClean="0"/>
-              <a:t>Questions? Comments? Come see us in </a:t>
-            </a:r>
-            <a:r>
-              <a:rPr lang="en-US" dirty="0" smtClean="0"/>
-              <a:t>S13, </a:t>
-            </a:r>
-            <a:r>
-              <a:rPr lang="en-US" dirty="0" smtClean="0"/>
-              <a:t>on </a:t>
-            </a:r>
-            <a:r>
-              <a:rPr lang="en-US" dirty="0" smtClean="0"/>
-              <a:t>Thursday, </a:t>
-            </a:r>
-            <a:r>
-              <a:rPr lang="en-US" dirty="0" smtClean="0"/>
-              <a:t>11:00 – 12:00</a:t>
+              <a:t>Questions? Comments? Come see us in S13, on Thursday, 11:00 – 12:00</a:t>
             </a:r>
             <a:endParaRPr lang="en-US" dirty="0"/>
           </a:p>
@@ -5186,13 +5104,7 @@
               <a:rPr lang="en-US">
                 <a:hlinkClick r:id="rId2"/>
               </a:rPr>
-              <a:t>http</a:t>
-            </a:r>
-            <a:r>
-              <a:rPr lang="en-US">
-                <a:hlinkClick r:id="rId2"/>
-              </a:rPr>
-              <a:t>://</a:t>
+              <a:t>http://</a:t>
             </a:r>
             <a:r>
               <a:rPr lang="en-US" smtClean="0">
@@ -5209,11 +5121,7 @@
           <a:p>
             <a:r>
               <a:rPr lang="en-US" dirty="0" smtClean="0"/>
-              <a:t>How </a:t>
-            </a:r>
-            <a:r>
-              <a:rPr lang="en-US" dirty="0" smtClean="0"/>
-              <a:t>does my solution to last week’s exercises differ from yours?</a:t>
+              <a:t>How does my solution to last week’s exercises differ from yours?</a:t>
             </a:r>
           </a:p>
           <a:p>

</xml_diff>

<commit_message>
Small tweaks to slides
</commit_message>
<xml_diff>
--- a/Python as an additional language/Lesson 5/Session 5.pptx
+++ b/Python as an additional language/Lesson 5/Session 5.pptx
@@ -214,7 +214,7 @@
           <a:p>
             <a:fld id="{6A67AACE-8014-D74E-92DB-28EF6A6E5763}" type="datetimeFigureOut">
               <a:rPr lang="en-US" smtClean="0"/>
-              <a:t>3/1/17</a:t>
+              <a:t>6/28/17</a:t>
             </a:fld>
             <a:endParaRPr lang="en-US"/>
           </a:p>
@@ -697,7 +697,7 @@
           <a:p>
             <a:fld id="{078E73EF-1331-0946-9B97-1355AD4A2800}" type="datetimeFigureOut">
               <a:rPr lang="en-US" smtClean="0"/>
-              <a:t>3/1/17</a:t>
+              <a:t>6/28/17</a:t>
             </a:fld>
             <a:endParaRPr lang="en-US"/>
           </a:p>
@@ -867,7 +867,7 @@
           <a:p>
             <a:fld id="{078E73EF-1331-0946-9B97-1355AD4A2800}" type="datetimeFigureOut">
               <a:rPr lang="en-US" smtClean="0"/>
-              <a:t>3/1/17</a:t>
+              <a:t>6/28/17</a:t>
             </a:fld>
             <a:endParaRPr lang="en-US"/>
           </a:p>
@@ -1047,7 +1047,7 @@
           <a:p>
             <a:fld id="{078E73EF-1331-0946-9B97-1355AD4A2800}" type="datetimeFigureOut">
               <a:rPr lang="en-US" smtClean="0"/>
-              <a:t>3/1/17</a:t>
+              <a:t>6/28/17</a:t>
             </a:fld>
             <a:endParaRPr lang="en-US"/>
           </a:p>
@@ -1217,7 +1217,7 @@
           <a:p>
             <a:fld id="{078E73EF-1331-0946-9B97-1355AD4A2800}" type="datetimeFigureOut">
               <a:rPr lang="en-US" smtClean="0"/>
-              <a:t>3/1/17</a:t>
+              <a:t>6/28/17</a:t>
             </a:fld>
             <a:endParaRPr lang="en-US"/>
           </a:p>
@@ -1463,7 +1463,7 @@
           <a:p>
             <a:fld id="{078E73EF-1331-0946-9B97-1355AD4A2800}" type="datetimeFigureOut">
               <a:rPr lang="en-US" smtClean="0"/>
-              <a:t>3/1/17</a:t>
+              <a:t>6/28/17</a:t>
             </a:fld>
             <a:endParaRPr lang="en-US"/>
           </a:p>
@@ -1695,7 +1695,7 @@
           <a:p>
             <a:fld id="{078E73EF-1331-0946-9B97-1355AD4A2800}" type="datetimeFigureOut">
               <a:rPr lang="en-US" smtClean="0"/>
-              <a:t>3/1/17</a:t>
+              <a:t>6/28/17</a:t>
             </a:fld>
             <a:endParaRPr lang="en-US"/>
           </a:p>
@@ -2062,7 +2062,7 @@
           <a:p>
             <a:fld id="{078E73EF-1331-0946-9B97-1355AD4A2800}" type="datetimeFigureOut">
               <a:rPr lang="en-US" smtClean="0"/>
-              <a:t>3/1/17</a:t>
+              <a:t>6/28/17</a:t>
             </a:fld>
             <a:endParaRPr lang="en-US"/>
           </a:p>
@@ -2180,7 +2180,7 @@
           <a:p>
             <a:fld id="{078E73EF-1331-0946-9B97-1355AD4A2800}" type="datetimeFigureOut">
               <a:rPr lang="en-US" smtClean="0"/>
-              <a:t>3/1/17</a:t>
+              <a:t>6/28/17</a:t>
             </a:fld>
             <a:endParaRPr lang="en-US"/>
           </a:p>
@@ -2275,7 +2275,7 @@
           <a:p>
             <a:fld id="{078E73EF-1331-0946-9B97-1355AD4A2800}" type="datetimeFigureOut">
               <a:rPr lang="en-US" smtClean="0"/>
-              <a:t>3/1/17</a:t>
+              <a:t>6/28/17</a:t>
             </a:fld>
             <a:endParaRPr lang="en-US"/>
           </a:p>
@@ -2552,7 +2552,7 @@
           <a:p>
             <a:fld id="{078E73EF-1331-0946-9B97-1355AD4A2800}" type="datetimeFigureOut">
               <a:rPr lang="en-US" smtClean="0"/>
-              <a:t>3/1/17</a:t>
+              <a:t>6/28/17</a:t>
             </a:fld>
             <a:endParaRPr lang="en-US"/>
           </a:p>
@@ -2805,7 +2805,7 @@
           <a:p>
             <a:fld id="{078E73EF-1331-0946-9B97-1355AD4A2800}" type="datetimeFigureOut">
               <a:rPr lang="en-US" smtClean="0"/>
-              <a:t>3/1/17</a:t>
+              <a:t>6/28/17</a:t>
             </a:fld>
             <a:endParaRPr lang="en-US"/>
           </a:p>
@@ -3018,7 +3018,7 @@
           <a:p>
             <a:fld id="{078E73EF-1331-0946-9B97-1355AD4A2800}" type="datetimeFigureOut">
               <a:rPr lang="en-US" smtClean="0"/>
-              <a:t>3/1/17</a:t>
+              <a:t>6/28/17</a:t>
             </a:fld>
             <a:endParaRPr lang="en-US"/>
           </a:p>
@@ -3565,11 +3565,7 @@
             <a:pPr algn="ctr"/>
             <a:r>
               <a:rPr lang="en-US" sz="2800" dirty="0" smtClean="0"/>
-              <a:t>Lesson 5: Getting Modular, </a:t>
-            </a:r>
-            <a:r>
-              <a:rPr lang="en-US" sz="2800" dirty="0" smtClean="0"/>
-              <a:t>and getting Classy</a:t>
+              <a:t>Lesson 5: Getting Modular, and getting Classy</a:t>
             </a:r>
             <a:endParaRPr lang="en-US" sz="2800" dirty="0"/>
           </a:p>
@@ -4259,9 +4255,39 @@
           </a:prstGeom>
         </p:spPr>
       </p:pic>
+      <p:sp>
+        <p:nvSpPr>
+          <p:cNvPr id="7" name="TextBox 6"/>
+          <p:cNvSpPr txBox="1"/>
+          <p:nvPr/>
+        </p:nvSpPr>
+        <p:spPr>
+          <a:xfrm>
+            <a:off x="4798786" y="3062549"/>
+            <a:ext cx="2427716" cy="461665"/>
+          </a:xfrm>
+          <a:prstGeom prst="rect">
+            <a:avLst/>
+          </a:prstGeom>
+          <a:noFill/>
+        </p:spPr>
+        <p:txBody>
+          <a:bodyPr wrap="none" rtlCol="0">
+            <a:spAutoFit/>
+          </a:bodyPr>
+          <a:lstStyle/>
+          <a:p>
+            <a:r>
+              <a:rPr lang="en-US" sz="2400" dirty="0" smtClean="0"/>
+              <a:t>What will this do?</a:t>
+            </a:r>
+            <a:endParaRPr lang="en-US" sz="2400" dirty="0"/>
+          </a:p>
+        </p:txBody>
+      </p:sp>
       <p:pic>
         <p:nvPicPr>
-          <p:cNvPr id="6" name="Content Placeholder 3"/>
+          <p:cNvPr id="8" name="Picture 7"/>
           <p:cNvPicPr>
             <a:picLocks noChangeAspect="1"/>
           </p:cNvPicPr>
@@ -4281,47 +4307,17 @@
         </p:blipFill>
         <p:spPr>
           <a:xfrm>
-            <a:off x="2559050" y="2127288"/>
-            <a:ext cx="7073900" cy="800100"/>
+            <a:off x="4540250" y="3524214"/>
+            <a:ext cx="3111500" cy="1130300"/>
           </a:xfrm>
           <a:prstGeom prst="rect">
             <a:avLst/>
           </a:prstGeom>
         </p:spPr>
       </p:pic>
-      <p:sp>
-        <p:nvSpPr>
-          <p:cNvPr id="7" name="TextBox 6"/>
-          <p:cNvSpPr txBox="1"/>
-          <p:nvPr/>
-        </p:nvSpPr>
-        <p:spPr>
-          <a:xfrm>
-            <a:off x="4798786" y="3062549"/>
-            <a:ext cx="2427716" cy="461665"/>
-          </a:xfrm>
-          <a:prstGeom prst="rect">
-            <a:avLst/>
-          </a:prstGeom>
-          <a:noFill/>
-        </p:spPr>
-        <p:txBody>
-          <a:bodyPr wrap="none" rtlCol="0">
-            <a:spAutoFit/>
-          </a:bodyPr>
-          <a:lstStyle/>
-          <a:p>
-            <a:r>
-              <a:rPr lang="en-US" sz="2400" dirty="0" smtClean="0"/>
-              <a:t>What will this do?</a:t>
-            </a:r>
-            <a:endParaRPr lang="en-US" sz="2400" dirty="0"/>
-          </a:p>
-        </p:txBody>
-      </p:sp>
       <p:pic>
         <p:nvPicPr>
-          <p:cNvPr id="8" name="Picture 7"/>
+          <p:cNvPr id="3" name="Picture 2"/>
           <p:cNvPicPr>
             <a:picLocks noChangeAspect="1"/>
           </p:cNvPicPr>
@@ -4341,8 +4337,8 @@
         </p:blipFill>
         <p:spPr>
           <a:xfrm>
-            <a:off x="4540250" y="3524214"/>
-            <a:ext cx="3111500" cy="1130300"/>
+            <a:off x="2283831" y="1856241"/>
+            <a:ext cx="7624337" cy="751209"/>
           </a:xfrm>
           <a:prstGeom prst="rect">
             <a:avLst/>
@@ -4948,7 +4944,31 @@
             <a:pPr algn="ctr"/>
             <a:r>
               <a:rPr lang="en-US" dirty="0" smtClean="0"/>
-              <a:t>Questions? Comments? Come see us in S13, on Thursday, 11:00 – 12:00</a:t>
+              <a:t>Questions? Comments? Come see us in </a:t>
+            </a:r>
+            <a:r>
+              <a:rPr lang="en-US" dirty="0" smtClean="0"/>
+              <a:t>S40, </a:t>
+            </a:r>
+            <a:r>
+              <a:rPr lang="en-US" dirty="0" smtClean="0"/>
+              <a:t>on </a:t>
+            </a:r>
+            <a:r>
+              <a:rPr lang="en-US" dirty="0" smtClean="0"/>
+              <a:t>Fri</a:t>
+            </a:r>
+            <a:r>
+              <a:rPr lang="en-US" dirty="0" smtClean="0"/>
+              <a:t>day</a:t>
+            </a:r>
+            <a:r>
+              <a:rPr lang="en-US" dirty="0" smtClean="0"/>
+              <a:t>, 11:00 – </a:t>
+            </a:r>
+            <a:r>
+              <a:rPr lang="en-US" dirty="0" smtClean="0"/>
+              <a:t>11:30</a:t>
             </a:r>
             <a:endParaRPr lang="en-US" dirty="0"/>
           </a:p>

</xml_diff>